<commit_message>
Updated few things in eagle-i presentation
</commit_message>
<xml_diff>
--- a/docs/presentations/OBI tutorial July 2011 ICBO/eagle-i-ICBO-tutorial.pptx
+++ b/docs/presentations/OBI tutorial July 2011 ICBO/eagle-i-ICBO-tutorial.pptx
@@ -10253,7 +10253,7 @@
               <a:defRPr/>
             </a:pPr>
             <a:r>
-              <a:rPr lang="en-US" b="1" smtClean="0">
+              <a:rPr lang="en-US" b="1" dirty="0" smtClean="0">
                 <a:solidFill>
                   <a:srgbClr val="800000"/>
                 </a:solidFill>
@@ -14677,7 +14677,11 @@
             </a:r>
             <a:r>
               <a:rPr lang="en-US" i="1" dirty="0" smtClean="0"/>
-              <a:t>measurement function</a:t>
+              <a:t>measure </a:t>
+            </a:r>
+            <a:r>
+              <a:rPr lang="en-US" i="1" dirty="0" smtClean="0"/>
+              <a:t>function</a:t>
             </a:r>
             <a:r>
               <a:rPr lang="en-US" dirty="0" smtClean="0"/>

</xml_diff>